<commit_message>
Added code and lectyre
</commit_message>
<xml_diff>
--- a/lpu_lectures/Lec19-b.pptx
+++ b/lpu_lectures/Lec19-b.pptx
@@ -5,7 +5,7 @@
     <p:sldMasterId id="2147483661" r:id="rId1"/>
   </p:sldMasterIdLst>
   <p:notesMasterIdLst>
-    <p:notesMasterId r:id="rId44"/>
+    <p:notesMasterId r:id="rId45"/>
   </p:notesMasterIdLst>
   <p:sldIdLst>
     <p:sldId id="256" r:id="rId2"/>
@@ -48,8 +48,9 @@
     <p:sldId id="395" r:id="rId39"/>
     <p:sldId id="397" r:id="rId40"/>
     <p:sldId id="398" r:id="rId41"/>
-    <p:sldId id="294" r:id="rId42"/>
-    <p:sldId id="295" r:id="rId43"/>
+    <p:sldId id="399" r:id="rId42"/>
+    <p:sldId id="294" r:id="rId43"/>
+    <p:sldId id="295" r:id="rId44"/>
   </p:sldIdLst>
   <p:sldSz cx="9144000" cy="5143500" type="screen16x9"/>
   <p:notesSz cx="6858000" cy="9144000"/>
@@ -4651,6 +4652,115 @@
     </p:spTree>
     <p:extLst>
       <p:ext uri="{BB962C8B-B14F-4D97-AF65-F5344CB8AC3E}">
+        <p14:creationId xmlns:p14="http://schemas.microsoft.com/office/powerpoint/2010/main" val="2269771455"/>
+      </p:ext>
+    </p:extLst>
+  </p:cSld>
+  <p:clrMapOvr>
+    <a:masterClrMapping/>
+  </p:clrMapOvr>
+</p:notes>
+</file>
+
+<file path=ppt/notesSlides/notesSlide42.xml><?xml version="1.0" encoding="utf-8"?>
+<p:notes xmlns:a="http://schemas.openxmlformats.org/drawingml/2006/main" xmlns:r="http://schemas.openxmlformats.org/officeDocument/2006/relationships" xmlns:p="http://schemas.openxmlformats.org/presentationml/2006/main" showMasterSp="0" showMasterPhAnim="0">
+  <p:cSld>
+    <p:spTree>
+      <p:nvGrpSpPr>
+        <p:cNvPr id="1" name="Shape 93"/>
+        <p:cNvGrpSpPr/>
+        <p:nvPr/>
+      </p:nvGrpSpPr>
+      <p:grpSpPr>
+        <a:xfrm>
+          <a:off x="0" y="0"/>
+          <a:ext cx="0" cy="0"/>
+          <a:chOff x="0" y="0"/>
+          <a:chExt cx="0" cy="0"/>
+        </a:xfrm>
+      </p:grpSpPr>
+      <p:sp>
+        <p:nvSpPr>
+          <p:cNvPr id="94" name="Google Shape;94;g96c5f5a607_0_30:notes"/>
+          <p:cNvSpPr txBox="1">
+            <a:spLocks noGrp="1"/>
+          </p:cNvSpPr>
+          <p:nvPr>
+            <p:ph type="body" idx="1"/>
+          </p:nvPr>
+        </p:nvSpPr>
+        <p:spPr>
+          <a:xfrm>
+            <a:off x="685800" y="4343378"/>
+            <a:ext cx="5486400" cy="4114800"/>
+          </a:xfrm>
+          <a:prstGeom prst="rect">
+            <a:avLst/>
+          </a:prstGeom>
+        </p:spPr>
+        <p:txBody>
+          <a:bodyPr spcFirstLastPara="1" wrap="square" lIns="91425" tIns="91425" rIns="91425" bIns="91425" anchor="t" anchorCtr="0">
+            <a:noAutofit/>
+          </a:bodyPr>
+          <a:lstStyle/>
+          <a:p>
+            <a:pPr marL="0" lvl="0" indent="0" algn="l" rtl="0">
+              <a:spcBef>
+                <a:spcPts val="0"/>
+              </a:spcBef>
+              <a:spcAft>
+                <a:spcPts val="0"/>
+              </a:spcAft>
+              <a:buNone/>
+            </a:pPr>
+            <a:endParaRPr/>
+          </a:p>
+        </p:txBody>
+      </p:sp>
+      <p:sp>
+        <p:nvSpPr>
+          <p:cNvPr id="95" name="Google Shape;95;g96c5f5a607_0_30:notes"/>
+          <p:cNvSpPr>
+            <a:spLocks noGrp="1" noRot="1" noChangeAspect="1"/>
+          </p:cNvSpPr>
+          <p:nvPr>
+            <p:ph type="sldImg" idx="2"/>
+          </p:nvPr>
+        </p:nvSpPr>
+        <p:spPr>
+          <a:xfrm>
+            <a:off x="381000" y="685800"/>
+            <a:ext cx="6096000" cy="3429000"/>
+          </a:xfrm>
+          <a:custGeom>
+            <a:avLst/>
+            <a:gdLst/>
+            <a:ahLst/>
+            <a:cxnLst/>
+            <a:rect l="l" t="t" r="r" b="b"/>
+            <a:pathLst>
+              <a:path w="120000" h="120000" extrusionOk="0">
+                <a:moveTo>
+                  <a:pt x="0" y="0"/>
+                </a:moveTo>
+                <a:lnTo>
+                  <a:pt x="120000" y="0"/>
+                </a:lnTo>
+                <a:lnTo>
+                  <a:pt x="120000" y="120000"/>
+                </a:lnTo>
+                <a:lnTo>
+                  <a:pt x="0" y="120000"/>
+                </a:lnTo>
+                <a:close/>
+              </a:path>
+            </a:pathLst>
+          </a:custGeom>
+        </p:spPr>
+      </p:sp>
+    </p:spTree>
+    <p:extLst>
+      <p:ext uri="{BB962C8B-B14F-4D97-AF65-F5344CB8AC3E}">
         <p14:creationId xmlns:p14="http://schemas.microsoft.com/office/powerpoint/2010/main" val="1709045327"/>
       </p:ext>
     </p:extLst>
@@ -4661,7 +4771,7 @@
 </p:notes>
 </file>
 
-<file path=ppt/notesSlides/notesSlide42.xml><?xml version="1.0" encoding="utf-8"?>
+<file path=ppt/notesSlides/notesSlide43.xml><?xml version="1.0" encoding="utf-8"?>
 <p:notes xmlns:a="http://schemas.openxmlformats.org/drawingml/2006/main" xmlns:r="http://schemas.openxmlformats.org/officeDocument/2006/relationships" xmlns:p="http://schemas.openxmlformats.org/presentationml/2006/main" showMasterSp="0" showMasterPhAnim="0">
   <p:cSld>
     <p:spTree>
@@ -29042,23 +29152,6 @@
             <a:endParaRPr lang="en-US" sz="1600" dirty="0"/>
           </a:p>
           <a:p>
-            <a:endParaRPr lang="en-US" sz="1600" dirty="0">
-              <a:solidFill>
-                <a:srgbClr val="FF0000"/>
-              </a:solidFill>
-            </a:endParaRPr>
-          </a:p>
-          <a:p>
-            <a:r>
-              <a:rPr lang="en-US" sz="1600" dirty="0">
-                <a:solidFill>
-                  <a:srgbClr val="FF0000"/>
-                </a:solidFill>
-              </a:rPr>
-              <a:t>Answer: option D</a:t>
-            </a:r>
-          </a:p>
-          <a:p>
             <a:endParaRPr lang="en-US" sz="1600" dirty="0"/>
           </a:p>
           <a:p>
@@ -29382,6 +29475,546 @@
 </file>
 
 <file path=ppt/slides/slide41.xml><?xml version="1.0" encoding="utf-8"?>
+<p:sld xmlns:a="http://schemas.openxmlformats.org/drawingml/2006/main" xmlns:r="http://schemas.openxmlformats.org/officeDocument/2006/relationships" xmlns:p="http://schemas.openxmlformats.org/presentationml/2006/main">
+  <p:cSld>
+    <p:spTree>
+      <p:nvGrpSpPr>
+        <p:cNvPr id="1" name="Shape 96"/>
+        <p:cNvGrpSpPr/>
+        <p:nvPr/>
+      </p:nvGrpSpPr>
+      <p:grpSpPr>
+        <a:xfrm>
+          <a:off x="0" y="0"/>
+          <a:ext cx="0" cy="0"/>
+          <a:chOff x="0" y="0"/>
+          <a:chExt cx="0" cy="0"/>
+        </a:xfrm>
+      </p:grpSpPr>
+      <p:sp>
+        <p:nvSpPr>
+          <p:cNvPr id="97" name="Google Shape;97;p19"/>
+          <p:cNvSpPr/>
+          <p:nvPr/>
+        </p:nvSpPr>
+        <p:spPr>
+          <a:xfrm>
+            <a:off x="0" y="-10633"/>
+            <a:ext cx="9144000" cy="636905"/>
+          </a:xfrm>
+          <a:custGeom>
+            <a:avLst/>
+            <a:gdLst/>
+            <a:ahLst/>
+            <a:cxnLst/>
+            <a:rect l="l" t="t" r="r" b="b"/>
+            <a:pathLst>
+              <a:path w="9144000" h="636905" extrusionOk="0">
+                <a:moveTo>
+                  <a:pt x="0" y="0"/>
+                </a:moveTo>
+                <a:lnTo>
+                  <a:pt x="9143981" y="0"/>
+                </a:lnTo>
+                <a:lnTo>
+                  <a:pt x="9143981" y="636898"/>
+                </a:lnTo>
+                <a:lnTo>
+                  <a:pt x="0" y="636898"/>
+                </a:lnTo>
+                <a:lnTo>
+                  <a:pt x="0" y="0"/>
+                </a:lnTo>
+                <a:close/>
+              </a:path>
+            </a:pathLst>
+          </a:custGeom>
+          <a:solidFill>
+            <a:srgbClr val="F4333F"/>
+          </a:solidFill>
+          <a:ln>
+            <a:noFill/>
+          </a:ln>
+        </p:spPr>
+        <p:txBody>
+          <a:bodyPr spcFirstLastPara="1" wrap="square" lIns="0" tIns="0" rIns="0" bIns="0" anchor="t" anchorCtr="0">
+            <a:noAutofit/>
+          </a:bodyPr>
+          <a:lstStyle/>
+          <a:p>
+            <a:pPr marL="0" marR="0" lvl="0" indent="0" algn="l" rtl="0">
+              <a:spcBef>
+                <a:spcPts val="0"/>
+              </a:spcBef>
+              <a:spcAft>
+                <a:spcPts val="0"/>
+              </a:spcAft>
+              <a:buNone/>
+            </a:pPr>
+            <a:endParaRPr sz="1800"/>
+          </a:p>
+        </p:txBody>
+      </p:sp>
+      <p:sp>
+        <p:nvSpPr>
+          <p:cNvPr id="100" name="Google Shape;100;p19"/>
+          <p:cNvSpPr txBox="1"/>
+          <p:nvPr/>
+        </p:nvSpPr>
+        <p:spPr>
+          <a:xfrm>
+            <a:off x="83685" y="671320"/>
+            <a:ext cx="8952289" cy="4379804"/>
+          </a:xfrm>
+          <a:prstGeom prst="rect">
+            <a:avLst/>
+          </a:prstGeom>
+          <a:noFill/>
+          <a:ln>
+            <a:noFill/>
+          </a:ln>
+        </p:spPr>
+        <p:txBody>
+          <a:bodyPr spcFirstLastPara="1" wrap="square" lIns="91425" tIns="91425" rIns="91425" bIns="91425" anchor="t" anchorCtr="0">
+            <a:noAutofit/>
+          </a:bodyPr>
+          <a:lstStyle/>
+          <a:p>
+            <a:r>
+              <a:rPr lang="en-US" sz="1600" dirty="0"/>
+              <a:t>What is the true about function overriding?</a:t>
+            </a:r>
+          </a:p>
+          <a:p>
+            <a:endParaRPr lang="en-US" sz="1600" dirty="0"/>
+          </a:p>
+          <a:p>
+            <a:pPr marL="342900" indent="-342900">
+              <a:buFont typeface="+mj-lt"/>
+              <a:buAutoNum type="arabicPeriod"/>
+            </a:pPr>
+            <a:r>
+              <a:rPr lang="en-US" sz="1600" dirty="0"/>
+              <a:t>It is function with same name , but it can differ in parameter list and types</a:t>
+            </a:r>
+          </a:p>
+          <a:p>
+            <a:pPr marL="342900" indent="-342900">
+              <a:buFont typeface="+mj-lt"/>
+              <a:buAutoNum type="arabicPeriod"/>
+            </a:pPr>
+            <a:r>
+              <a:rPr lang="en-US" sz="1600" dirty="0"/>
+              <a:t>It can only be implemented using inheritance</a:t>
+            </a:r>
+          </a:p>
+          <a:p>
+            <a:pPr marL="342900" indent="-342900">
+              <a:buFont typeface="+mj-lt"/>
+              <a:buAutoNum type="arabicPeriod"/>
+            </a:pPr>
+            <a:r>
+              <a:rPr lang="en-US" sz="1600" dirty="0"/>
+              <a:t>It is the function with same name , same parameter list and same return type</a:t>
+            </a:r>
+          </a:p>
+          <a:p>
+            <a:pPr marL="342900" indent="-342900">
+              <a:buFont typeface="+mj-lt"/>
+              <a:buAutoNum type="arabicPeriod"/>
+            </a:pPr>
+            <a:r>
+              <a:rPr lang="en-US" sz="1600" dirty="0"/>
+              <a:t>It is same as function overloading except function name is different in function overriding.</a:t>
+            </a:r>
+          </a:p>
+          <a:p>
+            <a:endParaRPr lang="en-US" sz="1600" dirty="0"/>
+          </a:p>
+          <a:p>
+            <a:pPr marL="342900" indent="-342900">
+              <a:buFont typeface="+mj-lt"/>
+              <a:buAutoNum type="alphaUcPeriod"/>
+            </a:pPr>
+            <a:r>
+              <a:rPr lang="en-US" sz="1600" dirty="0"/>
+              <a:t>1 &amp; 2</a:t>
+            </a:r>
+          </a:p>
+          <a:p>
+            <a:pPr marL="342900" indent="-342900">
+              <a:buFont typeface="+mj-lt"/>
+              <a:buAutoNum type="alphaUcPeriod"/>
+            </a:pPr>
+            <a:r>
+              <a:rPr lang="en-US" sz="1600" dirty="0"/>
+              <a:t>3 &amp; 4</a:t>
+            </a:r>
+          </a:p>
+          <a:p>
+            <a:pPr marL="342900" indent="-342900">
+              <a:buFont typeface="+mj-lt"/>
+              <a:buAutoNum type="alphaUcPeriod"/>
+            </a:pPr>
+            <a:r>
+              <a:rPr lang="en-US" sz="1600" dirty="0"/>
+              <a:t>1 &amp; 4</a:t>
+            </a:r>
+          </a:p>
+          <a:p>
+            <a:pPr marL="342900" indent="-342900">
+              <a:buFont typeface="+mj-lt"/>
+              <a:buAutoNum type="alphaUcPeriod"/>
+            </a:pPr>
+            <a:r>
+              <a:rPr lang="en-US" sz="1600" dirty="0"/>
+              <a:t>2 &amp; 3</a:t>
+            </a:r>
+          </a:p>
+          <a:p>
+            <a:endParaRPr lang="en-US" sz="1600" dirty="0"/>
+          </a:p>
+          <a:p>
+            <a:endParaRPr lang="en-US" sz="1600" dirty="0">
+              <a:solidFill>
+                <a:srgbClr val="FF0000"/>
+              </a:solidFill>
+            </a:endParaRPr>
+          </a:p>
+          <a:p>
+            <a:r>
+              <a:rPr lang="en-US" sz="1600" dirty="0">
+                <a:solidFill>
+                  <a:srgbClr val="FF0000"/>
+                </a:solidFill>
+              </a:rPr>
+              <a:t>Answer: option D</a:t>
+            </a:r>
+          </a:p>
+          <a:p>
+            <a:endParaRPr lang="en-US" sz="1600" dirty="0"/>
+          </a:p>
+          <a:p>
+            <a:endParaRPr lang="en-US" sz="1600" dirty="0"/>
+          </a:p>
+          <a:p>
+            <a:endParaRPr lang="en-US" sz="1600" dirty="0"/>
+          </a:p>
+        </p:txBody>
+      </p:sp>
+      <p:sp>
+        <p:nvSpPr>
+          <p:cNvPr id="8" name="Google Shape;99;p19">
+            <a:extLst>
+              <a:ext uri="{FF2B5EF4-FFF2-40B4-BE49-F238E27FC236}">
+                <a16:creationId xmlns:a16="http://schemas.microsoft.com/office/drawing/2014/main" id="{8A90869E-2300-483D-BE0B-A73EFF819635}"/>
+              </a:ext>
+            </a:extLst>
+          </p:cNvPr>
+          <p:cNvSpPr txBox="1">
+            <a:spLocks/>
+          </p:cNvSpPr>
+          <p:nvPr/>
+        </p:nvSpPr>
+        <p:spPr>
+          <a:xfrm>
+            <a:off x="389700" y="92375"/>
+            <a:ext cx="8646274" cy="391200"/>
+          </a:xfrm>
+          <a:prstGeom prst="rect">
+            <a:avLst/>
+          </a:prstGeom>
+          <a:noFill/>
+          <a:ln>
+            <a:noFill/>
+          </a:ln>
+        </p:spPr>
+        <p:txBody>
+          <a:bodyPr spcFirstLastPara="1" wrap="square" lIns="0" tIns="12700" rIns="0" bIns="0" anchor="t" anchorCtr="0">
+            <a:noAutofit/>
+          </a:bodyPr>
+          <a:lstStyle>
+            <a:defPPr marR="0" lvl="0" algn="l" rtl="0">
+              <a:lnSpc>
+                <a:spcPct val="100000"/>
+              </a:lnSpc>
+              <a:spcBef>
+                <a:spcPts val="0"/>
+              </a:spcBef>
+              <a:spcAft>
+                <a:spcPts val="0"/>
+              </a:spcAft>
+            </a:defPPr>
+            <a:lvl1pPr marR="0" lvl="0" algn="l" rtl="0">
+              <a:lnSpc>
+                <a:spcPct val="100000"/>
+              </a:lnSpc>
+              <a:spcBef>
+                <a:spcPts val="0"/>
+              </a:spcBef>
+              <a:spcAft>
+                <a:spcPts val="0"/>
+              </a:spcAft>
+              <a:buClr>
+                <a:schemeClr val="dk1"/>
+              </a:buClr>
+              <a:buSzPts val="2800"/>
+              <a:buFont typeface="Arial"/>
+              <a:buNone/>
+              <a:defRPr sz="4000" b="0" i="0" u="none" strike="noStrike" cap="none">
+                <a:solidFill>
+                  <a:schemeClr val="dk1"/>
+                </a:solidFill>
+                <a:latin typeface="Trebuchet MS"/>
+                <a:ea typeface="Trebuchet MS"/>
+                <a:cs typeface="Trebuchet MS"/>
+                <a:sym typeface="Trebuchet MS"/>
+              </a:defRPr>
+            </a:lvl1pPr>
+            <a:lvl2pPr marR="0" lvl="1" algn="l" rtl="0">
+              <a:lnSpc>
+                <a:spcPct val="100000"/>
+              </a:lnSpc>
+              <a:spcBef>
+                <a:spcPts val="0"/>
+              </a:spcBef>
+              <a:spcAft>
+                <a:spcPts val="0"/>
+              </a:spcAft>
+              <a:buClr>
+                <a:schemeClr val="dk1"/>
+              </a:buClr>
+              <a:buSzPts val="2800"/>
+              <a:buFont typeface="Arial"/>
+              <a:buNone/>
+              <a:defRPr sz="2800" b="0" i="0" u="none" strike="noStrike" cap="none">
+                <a:solidFill>
+                  <a:schemeClr val="dk1"/>
+                </a:solidFill>
+                <a:latin typeface="Arial"/>
+                <a:ea typeface="Arial"/>
+                <a:cs typeface="Arial"/>
+                <a:sym typeface="Arial"/>
+              </a:defRPr>
+            </a:lvl2pPr>
+            <a:lvl3pPr marR="0" lvl="2" algn="l" rtl="0">
+              <a:lnSpc>
+                <a:spcPct val="100000"/>
+              </a:lnSpc>
+              <a:spcBef>
+                <a:spcPts val="0"/>
+              </a:spcBef>
+              <a:spcAft>
+                <a:spcPts val="0"/>
+              </a:spcAft>
+              <a:buClr>
+                <a:schemeClr val="dk1"/>
+              </a:buClr>
+              <a:buSzPts val="2800"/>
+              <a:buFont typeface="Arial"/>
+              <a:buNone/>
+              <a:defRPr sz="2800" b="0" i="0" u="none" strike="noStrike" cap="none">
+                <a:solidFill>
+                  <a:schemeClr val="dk1"/>
+                </a:solidFill>
+                <a:latin typeface="Arial"/>
+                <a:ea typeface="Arial"/>
+                <a:cs typeface="Arial"/>
+                <a:sym typeface="Arial"/>
+              </a:defRPr>
+            </a:lvl3pPr>
+            <a:lvl4pPr marR="0" lvl="3" algn="l" rtl="0">
+              <a:lnSpc>
+                <a:spcPct val="100000"/>
+              </a:lnSpc>
+              <a:spcBef>
+                <a:spcPts val="0"/>
+              </a:spcBef>
+              <a:spcAft>
+                <a:spcPts val="0"/>
+              </a:spcAft>
+              <a:buClr>
+                <a:schemeClr val="dk1"/>
+              </a:buClr>
+              <a:buSzPts val="2800"/>
+              <a:buFont typeface="Arial"/>
+              <a:buNone/>
+              <a:defRPr sz="2800" b="0" i="0" u="none" strike="noStrike" cap="none">
+                <a:solidFill>
+                  <a:schemeClr val="dk1"/>
+                </a:solidFill>
+                <a:latin typeface="Arial"/>
+                <a:ea typeface="Arial"/>
+                <a:cs typeface="Arial"/>
+                <a:sym typeface="Arial"/>
+              </a:defRPr>
+            </a:lvl4pPr>
+            <a:lvl5pPr marR="0" lvl="4" algn="l" rtl="0">
+              <a:lnSpc>
+                <a:spcPct val="100000"/>
+              </a:lnSpc>
+              <a:spcBef>
+                <a:spcPts val="0"/>
+              </a:spcBef>
+              <a:spcAft>
+                <a:spcPts val="0"/>
+              </a:spcAft>
+              <a:buClr>
+                <a:schemeClr val="dk1"/>
+              </a:buClr>
+              <a:buSzPts val="2800"/>
+              <a:buFont typeface="Arial"/>
+              <a:buNone/>
+              <a:defRPr sz="2800" b="0" i="0" u="none" strike="noStrike" cap="none">
+                <a:solidFill>
+                  <a:schemeClr val="dk1"/>
+                </a:solidFill>
+                <a:latin typeface="Arial"/>
+                <a:ea typeface="Arial"/>
+                <a:cs typeface="Arial"/>
+                <a:sym typeface="Arial"/>
+              </a:defRPr>
+            </a:lvl5pPr>
+            <a:lvl6pPr marR="0" lvl="5" algn="l" rtl="0">
+              <a:lnSpc>
+                <a:spcPct val="100000"/>
+              </a:lnSpc>
+              <a:spcBef>
+                <a:spcPts val="0"/>
+              </a:spcBef>
+              <a:spcAft>
+                <a:spcPts val="0"/>
+              </a:spcAft>
+              <a:buClr>
+                <a:schemeClr val="dk1"/>
+              </a:buClr>
+              <a:buSzPts val="2800"/>
+              <a:buFont typeface="Arial"/>
+              <a:buNone/>
+              <a:defRPr sz="2800" b="0" i="0" u="none" strike="noStrike" cap="none">
+                <a:solidFill>
+                  <a:schemeClr val="dk1"/>
+                </a:solidFill>
+                <a:latin typeface="Arial"/>
+                <a:ea typeface="Arial"/>
+                <a:cs typeface="Arial"/>
+                <a:sym typeface="Arial"/>
+              </a:defRPr>
+            </a:lvl6pPr>
+            <a:lvl7pPr marR="0" lvl="6" algn="l" rtl="0">
+              <a:lnSpc>
+                <a:spcPct val="100000"/>
+              </a:lnSpc>
+              <a:spcBef>
+                <a:spcPts val="0"/>
+              </a:spcBef>
+              <a:spcAft>
+                <a:spcPts val="0"/>
+              </a:spcAft>
+              <a:buClr>
+                <a:schemeClr val="dk1"/>
+              </a:buClr>
+              <a:buSzPts val="2800"/>
+              <a:buFont typeface="Arial"/>
+              <a:buNone/>
+              <a:defRPr sz="2800" b="0" i="0" u="none" strike="noStrike" cap="none">
+                <a:solidFill>
+                  <a:schemeClr val="dk1"/>
+                </a:solidFill>
+                <a:latin typeface="Arial"/>
+                <a:ea typeface="Arial"/>
+                <a:cs typeface="Arial"/>
+                <a:sym typeface="Arial"/>
+              </a:defRPr>
+            </a:lvl7pPr>
+            <a:lvl8pPr marR="0" lvl="7" algn="l" rtl="0">
+              <a:lnSpc>
+                <a:spcPct val="100000"/>
+              </a:lnSpc>
+              <a:spcBef>
+                <a:spcPts val="0"/>
+              </a:spcBef>
+              <a:spcAft>
+                <a:spcPts val="0"/>
+              </a:spcAft>
+              <a:buClr>
+                <a:schemeClr val="dk1"/>
+              </a:buClr>
+              <a:buSzPts val="2800"/>
+              <a:buFont typeface="Arial"/>
+              <a:buNone/>
+              <a:defRPr sz="2800" b="0" i="0" u="none" strike="noStrike" cap="none">
+                <a:solidFill>
+                  <a:schemeClr val="dk1"/>
+                </a:solidFill>
+                <a:latin typeface="Arial"/>
+                <a:ea typeface="Arial"/>
+                <a:cs typeface="Arial"/>
+                <a:sym typeface="Arial"/>
+              </a:defRPr>
+            </a:lvl8pPr>
+            <a:lvl9pPr marR="0" lvl="8" algn="l" rtl="0">
+              <a:lnSpc>
+                <a:spcPct val="100000"/>
+              </a:lnSpc>
+              <a:spcBef>
+                <a:spcPts val="0"/>
+              </a:spcBef>
+              <a:spcAft>
+                <a:spcPts val="0"/>
+              </a:spcAft>
+              <a:buClr>
+                <a:schemeClr val="dk1"/>
+              </a:buClr>
+              <a:buSzPts val="2800"/>
+              <a:buFont typeface="Arial"/>
+              <a:buNone/>
+              <a:defRPr sz="2800" b="0" i="0" u="none" strike="noStrike" cap="none">
+                <a:solidFill>
+                  <a:schemeClr val="dk1"/>
+                </a:solidFill>
+                <a:latin typeface="Arial"/>
+                <a:ea typeface="Arial"/>
+                <a:cs typeface="Arial"/>
+                <a:sym typeface="Arial"/>
+              </a:defRPr>
+            </a:lvl9pPr>
+          </a:lstStyle>
+          <a:p>
+            <a:r>
+              <a:rPr lang="en-IN" sz="2400" b="1" dirty="0">
+                <a:solidFill>
+                  <a:srgbClr val="FFFFFF"/>
+                </a:solidFill>
+                <a:latin typeface="Calibri" panose="020F0502020204030204" pitchFamily="34" charset="0"/>
+                <a:cs typeface="Calibri" panose="020F0502020204030204" pitchFamily="34" charset="0"/>
+              </a:rPr>
+              <a:t>MCQ</a:t>
+            </a:r>
+            <a:endParaRPr lang="en" sz="2400" b="1" dirty="0">
+              <a:solidFill>
+                <a:srgbClr val="FFFFFF"/>
+              </a:solidFill>
+              <a:latin typeface="Calibri" panose="020F0502020204030204" pitchFamily="34" charset="0"/>
+              <a:cs typeface="Calibri" panose="020F0502020204030204" pitchFamily="34" charset="0"/>
+            </a:endParaRPr>
+          </a:p>
+        </p:txBody>
+      </p:sp>
+    </p:spTree>
+    <p:extLst>
+      <p:ext uri="{BB962C8B-B14F-4D97-AF65-F5344CB8AC3E}">
+        <p14:creationId xmlns:p14="http://schemas.microsoft.com/office/powerpoint/2010/main" val="3799826268"/>
+      </p:ext>
+    </p:extLst>
+  </p:cSld>
+  <p:clrMapOvr>
+    <a:masterClrMapping/>
+  </p:clrMapOvr>
+</p:sld>
+</file>
+
+<file path=ppt/slides/slide42.xml><?xml version="1.0" encoding="utf-8"?>
 <p:sld xmlns:a="http://schemas.openxmlformats.org/drawingml/2006/main" xmlns:r="http://schemas.openxmlformats.org/officeDocument/2006/relationships" xmlns:p="http://schemas.openxmlformats.org/presentationml/2006/main">
   <p:cSld>
     <p:spTree>
@@ -29914,7 +30547,7 @@
 </p:sld>
 </file>
 
-<file path=ppt/slides/slide42.xml><?xml version="1.0" encoding="utf-8"?>
+<file path=ppt/slides/slide43.xml><?xml version="1.0" encoding="utf-8"?>
 <p:sld xmlns:a="http://schemas.openxmlformats.org/drawingml/2006/main" xmlns:r="http://schemas.openxmlformats.org/officeDocument/2006/relationships" xmlns:p="http://schemas.openxmlformats.org/presentationml/2006/main">
   <p:cSld>
     <p:spTree>

</xml_diff>